<commit_message>
AP and CV genome
</commit_message>
<xml_diff>
--- a/synteny.pptx
+++ b/synteny.pptx
@@ -260,7 +260,7 @@
           <a:p>
             <a:fld id="{EC5D5901-00D9-4DE9-BB38-AE3383FB48B5}" type="datetimeFigureOut">
               <a:rPr lang="zh-TW" altLang="en-US" smtClean="0"/>
-              <a:t>2024/9/10</a:t>
+              <a:t>2024/9/14</a:t>
             </a:fld>
             <a:endParaRPr lang="zh-TW" altLang="en-US"/>
           </a:p>
@@ -458,7 +458,7 @@
           <a:p>
             <a:fld id="{EC5D5901-00D9-4DE9-BB38-AE3383FB48B5}" type="datetimeFigureOut">
               <a:rPr lang="zh-TW" altLang="en-US" smtClean="0"/>
-              <a:t>2024/9/10</a:t>
+              <a:t>2024/9/14</a:t>
             </a:fld>
             <a:endParaRPr lang="zh-TW" altLang="en-US"/>
           </a:p>
@@ -666,7 +666,7 @@
           <a:p>
             <a:fld id="{EC5D5901-00D9-4DE9-BB38-AE3383FB48B5}" type="datetimeFigureOut">
               <a:rPr lang="zh-TW" altLang="en-US" smtClean="0"/>
-              <a:t>2024/9/10</a:t>
+              <a:t>2024/9/14</a:t>
             </a:fld>
             <a:endParaRPr lang="zh-TW" altLang="en-US"/>
           </a:p>
@@ -864,7 +864,7 @@
           <a:p>
             <a:fld id="{EC5D5901-00D9-4DE9-BB38-AE3383FB48B5}" type="datetimeFigureOut">
               <a:rPr lang="zh-TW" altLang="en-US" smtClean="0"/>
-              <a:t>2024/9/10</a:t>
+              <a:t>2024/9/14</a:t>
             </a:fld>
             <a:endParaRPr lang="zh-TW" altLang="en-US"/>
           </a:p>
@@ -1139,7 +1139,7 @@
           <a:p>
             <a:fld id="{EC5D5901-00D9-4DE9-BB38-AE3383FB48B5}" type="datetimeFigureOut">
               <a:rPr lang="zh-TW" altLang="en-US" smtClean="0"/>
-              <a:t>2024/9/10</a:t>
+              <a:t>2024/9/14</a:t>
             </a:fld>
             <a:endParaRPr lang="zh-TW" altLang="en-US"/>
           </a:p>
@@ -1404,7 +1404,7 @@
           <a:p>
             <a:fld id="{EC5D5901-00D9-4DE9-BB38-AE3383FB48B5}" type="datetimeFigureOut">
               <a:rPr lang="zh-TW" altLang="en-US" smtClean="0"/>
-              <a:t>2024/9/10</a:t>
+              <a:t>2024/9/14</a:t>
             </a:fld>
             <a:endParaRPr lang="zh-TW" altLang="en-US"/>
           </a:p>
@@ -1816,7 +1816,7 @@
           <a:p>
             <a:fld id="{EC5D5901-00D9-4DE9-BB38-AE3383FB48B5}" type="datetimeFigureOut">
               <a:rPr lang="zh-TW" altLang="en-US" smtClean="0"/>
-              <a:t>2024/9/10</a:t>
+              <a:t>2024/9/14</a:t>
             </a:fld>
             <a:endParaRPr lang="zh-TW" altLang="en-US"/>
           </a:p>
@@ -1957,7 +1957,7 @@
           <a:p>
             <a:fld id="{EC5D5901-00D9-4DE9-BB38-AE3383FB48B5}" type="datetimeFigureOut">
               <a:rPr lang="zh-TW" altLang="en-US" smtClean="0"/>
-              <a:t>2024/9/10</a:t>
+              <a:t>2024/9/14</a:t>
             </a:fld>
             <a:endParaRPr lang="zh-TW" altLang="en-US"/>
           </a:p>
@@ -2070,7 +2070,7 @@
           <a:p>
             <a:fld id="{EC5D5901-00D9-4DE9-BB38-AE3383FB48B5}" type="datetimeFigureOut">
               <a:rPr lang="zh-TW" altLang="en-US" smtClean="0"/>
-              <a:t>2024/9/10</a:t>
+              <a:t>2024/9/14</a:t>
             </a:fld>
             <a:endParaRPr lang="zh-TW" altLang="en-US"/>
           </a:p>
@@ -2381,7 +2381,7 @@
           <a:p>
             <a:fld id="{EC5D5901-00D9-4DE9-BB38-AE3383FB48B5}" type="datetimeFigureOut">
               <a:rPr lang="zh-TW" altLang="en-US" smtClean="0"/>
-              <a:t>2024/9/10</a:t>
+              <a:t>2024/9/14</a:t>
             </a:fld>
             <a:endParaRPr lang="zh-TW" altLang="en-US"/>
           </a:p>
@@ -2669,7 +2669,7 @@
           <a:p>
             <a:fld id="{EC5D5901-00D9-4DE9-BB38-AE3383FB48B5}" type="datetimeFigureOut">
               <a:rPr lang="zh-TW" altLang="en-US" smtClean="0"/>
-              <a:t>2024/9/10</a:t>
+              <a:t>2024/9/14</a:t>
             </a:fld>
             <a:endParaRPr lang="zh-TW" altLang="en-US"/>
           </a:p>
@@ -2910,7 +2910,7 @@
           <a:p>
             <a:fld id="{EC5D5901-00D9-4DE9-BB38-AE3383FB48B5}" type="datetimeFigureOut">
               <a:rPr lang="zh-TW" altLang="en-US" smtClean="0"/>
-              <a:t>2024/9/10</a:t>
+              <a:t>2024/9/14</a:t>
             </a:fld>
             <a:endParaRPr lang="zh-TW" altLang="en-US"/>
           </a:p>
@@ -3382,7 +3382,7 @@
         </p:nvCxnSpPr>
         <p:spPr>
           <a:xfrm>
-            <a:off x="358876" y="5119839"/>
+            <a:off x="388372" y="4372585"/>
             <a:ext cx="3397045" cy="0"/>
           </a:xfrm>
           <a:prstGeom prst="line">
@@ -3421,7 +3421,7 @@
         </p:nvCxnSpPr>
         <p:spPr>
           <a:xfrm>
-            <a:off x="4650661" y="5119839"/>
+            <a:off x="4680157" y="4372585"/>
             <a:ext cx="2182763" cy="0"/>
           </a:xfrm>
           <a:prstGeom prst="line">
@@ -3458,7 +3458,7 @@
         </p:nvSpPr>
         <p:spPr>
           <a:xfrm>
-            <a:off x="1671788" y="821026"/>
+            <a:off x="1274659" y="842005"/>
             <a:ext cx="4168265" cy="523220"/>
           </a:xfrm>
           <a:prstGeom prst="rect">
@@ -3493,7 +3493,7 @@
         </p:nvSpPr>
         <p:spPr>
           <a:xfrm>
-            <a:off x="1209369" y="4158424"/>
+            <a:off x="1238865" y="3411170"/>
             <a:ext cx="1209368" cy="369332"/>
           </a:xfrm>
           <a:prstGeom prst="rect">
@@ -3528,7 +3528,7 @@
         </p:nvSpPr>
         <p:spPr>
           <a:xfrm>
-            <a:off x="5171774" y="4185773"/>
+            <a:off x="5201270" y="3438519"/>
             <a:ext cx="1307690" cy="369332"/>
           </a:xfrm>
           <a:prstGeom prst="rect">
@@ -3565,7 +3565,7 @@
         </p:nvCxnSpPr>
         <p:spPr>
           <a:xfrm>
-            <a:off x="8052627" y="5119839"/>
+            <a:off x="8082123" y="4372585"/>
             <a:ext cx="2182763" cy="0"/>
           </a:xfrm>
           <a:prstGeom prst="line">
@@ -3602,7 +3602,7 @@
         </p:nvSpPr>
         <p:spPr>
           <a:xfrm>
-            <a:off x="8573740" y="4158424"/>
+            <a:off x="8603236" y="3411170"/>
             <a:ext cx="1307690" cy="369332"/>
           </a:xfrm>
           <a:prstGeom prst="rect">
@@ -3776,7 +3776,7 @@
         </p:nvSpPr>
         <p:spPr>
           <a:xfrm rot="10800000">
-            <a:off x="1379594" y="4935174"/>
+            <a:off x="1409090" y="4187920"/>
             <a:ext cx="551834" cy="369329"/>
           </a:xfrm>
           <a:prstGeom prst="leftArrow">
@@ -3822,7 +3822,7 @@
         </p:nvSpPr>
         <p:spPr>
           <a:xfrm>
-            <a:off x="1984282" y="4935173"/>
+            <a:off x="2013778" y="4187919"/>
             <a:ext cx="551834" cy="369329"/>
           </a:xfrm>
           <a:prstGeom prst="leftArrow">
@@ -3868,7 +3868,7 @@
         </p:nvSpPr>
         <p:spPr>
           <a:xfrm rot="10800000">
-            <a:off x="5309439" y="4935172"/>
+            <a:off x="5338935" y="4187918"/>
             <a:ext cx="551834" cy="369329"/>
           </a:xfrm>
           <a:prstGeom prst="leftArrow">
@@ -3914,7 +3914,7 @@
         </p:nvSpPr>
         <p:spPr>
           <a:xfrm>
-            <a:off x="8675751" y="4935171"/>
+            <a:off x="8705247" y="4187917"/>
             <a:ext cx="551834" cy="369329"/>
           </a:xfrm>
           <a:prstGeom prst="leftArrow">
@@ -4427,7 +4427,7 @@
         </p:nvSpPr>
         <p:spPr>
           <a:xfrm rot="10800000">
-            <a:off x="2818798" y="4929216"/>
+            <a:off x="2848294" y="4181962"/>
             <a:ext cx="551834" cy="369329"/>
           </a:xfrm>
           <a:prstGeom prst="leftArrow">
@@ -4471,7 +4471,7 @@
         </p:nvSpPr>
         <p:spPr>
           <a:xfrm>
-            <a:off x="2460375" y="5477250"/>
+            <a:off x="2489871" y="4729996"/>
             <a:ext cx="1993637" cy="738664"/>
           </a:xfrm>
           <a:prstGeom prst="rect">
@@ -4521,7 +4521,7 @@
         </p:nvSpPr>
         <p:spPr>
           <a:xfrm rot="10800000">
-            <a:off x="528648" y="4929216"/>
+            <a:off x="558144" y="4181962"/>
             <a:ext cx="551834" cy="369329"/>
           </a:xfrm>
           <a:prstGeom prst="leftArrow">
@@ -4565,7 +4565,7 @@
         </p:nvSpPr>
         <p:spPr>
           <a:xfrm>
-            <a:off x="170226" y="5477250"/>
+            <a:off x="199722" y="4729996"/>
             <a:ext cx="1761204" cy="1015663"/>
           </a:xfrm>
           <a:prstGeom prst="rect">
@@ -4615,7 +4615,7 @@
         </p:nvSpPr>
         <p:spPr>
           <a:xfrm>
-            <a:off x="10164729" y="4935174"/>
+            <a:off x="10194225" y="4187920"/>
             <a:ext cx="551834" cy="369329"/>
           </a:xfrm>
           <a:prstGeom prst="leftArrow">
@@ -4659,7 +4659,7 @@
         </p:nvSpPr>
         <p:spPr>
           <a:xfrm>
-            <a:off x="10001577" y="5517308"/>
+            <a:off x="10031073" y="4770054"/>
             <a:ext cx="2182762" cy="738664"/>
           </a:xfrm>
           <a:prstGeom prst="rect">
@@ -4709,7 +4709,7 @@
         </p:nvSpPr>
         <p:spPr>
           <a:xfrm>
-            <a:off x="8004387" y="4946113"/>
+            <a:off x="8033883" y="4198859"/>
             <a:ext cx="551834" cy="369329"/>
           </a:xfrm>
           <a:prstGeom prst="leftArrow">
@@ -4753,7 +4753,7 @@
         </p:nvSpPr>
         <p:spPr>
           <a:xfrm>
-            <a:off x="7841235" y="5528247"/>
+            <a:off x="7870731" y="4780993"/>
             <a:ext cx="1890390" cy="738664"/>
           </a:xfrm>
           <a:prstGeom prst="rect">
@@ -4803,7 +4803,7 @@
         </p:nvSpPr>
         <p:spPr>
           <a:xfrm>
-            <a:off x="4618550" y="4929215"/>
+            <a:off x="4648046" y="4181961"/>
             <a:ext cx="551834" cy="369329"/>
           </a:xfrm>
           <a:prstGeom prst="leftArrow">
@@ -4847,7 +4847,7 @@
         </p:nvSpPr>
         <p:spPr>
           <a:xfrm>
-            <a:off x="5972340" y="4953053"/>
+            <a:off x="6001836" y="4205799"/>
             <a:ext cx="551834" cy="369329"/>
           </a:xfrm>
           <a:prstGeom prst="leftArrow">
@@ -4891,7 +4891,7 @@
         </p:nvSpPr>
         <p:spPr>
           <a:xfrm>
-            <a:off x="6630632" y="4946110"/>
+            <a:off x="6660128" y="4198856"/>
             <a:ext cx="551834" cy="369329"/>
           </a:xfrm>
           <a:prstGeom prst="leftArrow">
@@ -4918,6 +4918,178 @@
           <a:p>
             <a:pPr algn="ctr"/>
             <a:endParaRPr lang="zh-TW" altLang="en-US" dirty="0"/>
+          </a:p>
+        </p:txBody>
+      </p:sp>
+      <p:sp>
+        <p:nvSpPr>
+          <p:cNvPr id="2" name="文字方塊 1">
+            <a:extLst>
+              <a:ext uri="{FF2B5EF4-FFF2-40B4-BE49-F238E27FC236}">
+                <a16:creationId xmlns:a16="http://schemas.microsoft.com/office/drawing/2014/main" id="{2DC5270D-1B20-0F77-4D1F-72199B43527D}"/>
+              </a:ext>
+            </a:extLst>
+          </p:cNvPr>
+          <p:cNvSpPr txBox="1"/>
+          <p:nvPr/>
+        </p:nvSpPr>
+        <p:spPr>
+          <a:xfrm>
+            <a:off x="4415755" y="4675945"/>
+            <a:ext cx="1405085" cy="954107"/>
+          </a:xfrm>
+          <a:prstGeom prst="rect">
+            <a:avLst/>
+          </a:prstGeom>
+          <a:noFill/>
+        </p:spPr>
+        <p:txBody>
+          <a:bodyPr wrap="square">
+            <a:spAutoFit/>
+          </a:bodyPr>
+          <a:lstStyle/>
+          <a:p>
+            <a:r>
+              <a:rPr lang="en-US" altLang="zh-TW" sz="1400" dirty="0">
+                <a:solidFill>
+                  <a:schemeClr val="accent2">
+                    <a:lumMod val="60000"/>
+                    <a:lumOff val="40000"/>
+                  </a:schemeClr>
+                </a:solidFill>
+              </a:rPr>
+              <a:t>g16523.t1,  DNA-binding protein SMUBP-2 </a:t>
+            </a:r>
+            <a:endParaRPr lang="zh-TW" altLang="en-US" sz="1400" dirty="0">
+              <a:solidFill>
+                <a:schemeClr val="accent2">
+                  <a:lumMod val="60000"/>
+                  <a:lumOff val="40000"/>
+                </a:schemeClr>
+              </a:solidFill>
+            </a:endParaRPr>
+          </a:p>
+        </p:txBody>
+      </p:sp>
+      <p:sp>
+        <p:nvSpPr>
+          <p:cNvPr id="12" name="文字方塊 11">
+            <a:extLst>
+              <a:ext uri="{FF2B5EF4-FFF2-40B4-BE49-F238E27FC236}">
+                <a16:creationId xmlns:a16="http://schemas.microsoft.com/office/drawing/2014/main" id="{23D82997-739A-51BC-6354-332B99154D34}"/>
+              </a:ext>
+            </a:extLst>
+          </p:cNvPr>
+          <p:cNvSpPr txBox="1"/>
+          <p:nvPr/>
+        </p:nvSpPr>
+        <p:spPr>
+          <a:xfrm>
+            <a:off x="5806877" y="4665299"/>
+            <a:ext cx="1405085" cy="1600438"/>
+          </a:xfrm>
+          <a:prstGeom prst="rect">
+            <a:avLst/>
+          </a:prstGeom>
+          <a:noFill/>
+        </p:spPr>
+        <p:txBody>
+          <a:bodyPr wrap="square">
+            <a:spAutoFit/>
+          </a:bodyPr>
+          <a:lstStyle/>
+          <a:p>
+            <a:r>
+              <a:rPr lang="en-US" altLang="zh-TW" sz="1400" dirty="0">
+                <a:solidFill>
+                  <a:schemeClr val="accent2">
+                    <a:lumMod val="60000"/>
+                    <a:lumOff val="40000"/>
+                  </a:schemeClr>
+                </a:solidFill>
+              </a:rPr>
+              <a:t>g16525.t1, glutamine </a:t>
+            </a:r>
+            <a:r>
+              <a:rPr lang="en-US" altLang="zh-TW" sz="1400" dirty="0" err="1">
+                <a:solidFill>
+                  <a:schemeClr val="accent2">
+                    <a:lumMod val="60000"/>
+                    <a:lumOff val="40000"/>
+                  </a:schemeClr>
+                </a:solidFill>
+              </a:rPr>
+              <a:t>amidotransferase</a:t>
+            </a:r>
+            <a:r>
+              <a:rPr lang="en-US" altLang="zh-TW" sz="1400" dirty="0">
+                <a:solidFill>
+                  <a:schemeClr val="accent2">
+                    <a:lumMod val="60000"/>
+                    <a:lumOff val="40000"/>
+                  </a:schemeClr>
+                </a:solidFill>
+              </a:rPr>
+              <a:t>-like class 1 domain-containing protein 1</a:t>
+            </a:r>
+            <a:endParaRPr lang="zh-TW" altLang="en-US" sz="1400" dirty="0">
+              <a:solidFill>
+                <a:schemeClr val="accent2">
+                  <a:lumMod val="60000"/>
+                  <a:lumOff val="40000"/>
+                </a:schemeClr>
+              </a:solidFill>
+            </a:endParaRPr>
+          </a:p>
+        </p:txBody>
+      </p:sp>
+      <p:sp>
+        <p:nvSpPr>
+          <p:cNvPr id="14" name="文字方塊 13">
+            <a:extLst>
+              <a:ext uri="{FF2B5EF4-FFF2-40B4-BE49-F238E27FC236}">
+                <a16:creationId xmlns:a16="http://schemas.microsoft.com/office/drawing/2014/main" id="{FCA3ABAC-DFAF-6981-A60A-8AC5F74EA9AF}"/>
+              </a:ext>
+            </a:extLst>
+          </p:cNvPr>
+          <p:cNvSpPr txBox="1"/>
+          <p:nvPr/>
+        </p:nvSpPr>
+        <p:spPr>
+          <a:xfrm>
+            <a:off x="6823584" y="4638043"/>
+            <a:ext cx="1405085" cy="307777"/>
+          </a:xfrm>
+          <a:prstGeom prst="rect">
+            <a:avLst/>
+          </a:prstGeom>
+          <a:noFill/>
+        </p:spPr>
+        <p:txBody>
+          <a:bodyPr wrap="square">
+            <a:spAutoFit/>
+          </a:bodyPr>
+          <a:lstStyle/>
+          <a:p>
+            <a:r>
+              <a:rPr lang="en-US" altLang="zh-TW" sz="1400" dirty="0">
+                <a:solidFill>
+                  <a:schemeClr val="accent2">
+                    <a:lumMod val="60000"/>
+                    <a:lumOff val="40000"/>
+                  </a:schemeClr>
+                </a:solidFill>
+              </a:rPr>
+              <a:t>CD151 antigen </a:t>
+            </a:r>
+            <a:endParaRPr lang="zh-TW" altLang="en-US" sz="1400" dirty="0">
+              <a:solidFill>
+                <a:schemeClr val="accent2">
+                  <a:lumMod val="60000"/>
+                  <a:lumOff val="40000"/>
+                </a:schemeClr>
+              </a:solidFill>
+            </a:endParaRPr>
           </a:p>
         </p:txBody>
       </p:sp>

</xml_diff>